<commit_message>
Update Project Application Development 1.1.pptx
</commit_message>
<xml_diff>
--- a/Paper Work/Presentation/Project Application Development 1.1.pptx
+++ b/Paper Work/Presentation/Project Application Development 1.1.pptx
@@ -5,10 +5,10 @@
     <p:sldMasterId id="2147483695" r:id="rId1"/>
   </p:sldMasterIdLst>
   <p:notesMasterIdLst>
-    <p:notesMasterId r:id="rId14"/>
+    <p:notesMasterId r:id="rId15"/>
   </p:notesMasterIdLst>
   <p:handoutMasterIdLst>
-    <p:handoutMasterId r:id="rId15"/>
+    <p:handoutMasterId r:id="rId16"/>
   </p:handoutMasterIdLst>
   <p:sldIdLst>
     <p:sldId id="257" r:id="rId2"/>
@@ -21,8 +21,9 @@
     <p:sldId id="279" r:id="rId9"/>
     <p:sldId id="280" r:id="rId10"/>
     <p:sldId id="277" r:id="rId11"/>
-    <p:sldId id="276" r:id="rId12"/>
-    <p:sldId id="278" r:id="rId13"/>
+    <p:sldId id="282" r:id="rId12"/>
+    <p:sldId id="276" r:id="rId13"/>
+    <p:sldId id="278" r:id="rId14"/>
   </p:sldIdLst>
   <p:sldSz cx="9828213" cy="6858000"/>
   <p:notesSz cx="7023100" cy="9309100"/>
@@ -735,6 +736,98 @@
 </p:notes>
 </file>
 
+<file path=ppt/notesSlides/notesSlide10.xml><?xml version="1.0" encoding="utf-8"?>
+<p:notes xmlns:a="http://schemas.openxmlformats.org/drawingml/2006/main" xmlns:r="http://schemas.openxmlformats.org/officeDocument/2006/relationships" xmlns:p="http://schemas.openxmlformats.org/presentationml/2006/main">
+  <p:cSld>
+    <p:spTree>
+      <p:nvGrpSpPr>
+        <p:cNvPr id="1" name=""/>
+        <p:cNvGrpSpPr/>
+        <p:nvPr/>
+      </p:nvGrpSpPr>
+      <p:grpSpPr>
+        <a:xfrm>
+          <a:off x="0" y="0"/>
+          <a:ext cx="0" cy="0"/>
+          <a:chOff x="0" y="0"/>
+          <a:chExt cx="0" cy="0"/>
+        </a:xfrm>
+      </p:grpSpPr>
+      <p:sp>
+        <p:nvSpPr>
+          <p:cNvPr id="2" name="Slide Image Placeholder 1"/>
+          <p:cNvSpPr>
+            <a:spLocks noGrp="1" noRot="1" noChangeAspect="1"/>
+          </p:cNvSpPr>
+          <p:nvPr>
+            <p:ph type="sldImg"/>
+          </p:nvPr>
+        </p:nvSpPr>
+        <p:spPr>
+          <a:xfrm>
+            <a:off x="1260475" y="1163638"/>
+            <a:ext cx="4502150" cy="3141662"/>
+          </a:xfrm>
+        </p:spPr>
+      </p:sp>
+      <p:sp>
+        <p:nvSpPr>
+          <p:cNvPr id="3" name="Notes Placeholder 2"/>
+          <p:cNvSpPr>
+            <a:spLocks noGrp="1"/>
+          </p:cNvSpPr>
+          <p:nvPr>
+            <p:ph type="body" idx="1"/>
+          </p:nvPr>
+        </p:nvSpPr>
+        <p:spPr/>
+        <p:txBody>
+          <a:bodyPr>
+            <a:normAutofit/>
+          </a:bodyPr>
+          <a:lstStyle/>
+          <a:p>
+            <a:endParaRPr lang="en-US"/>
+          </a:p>
+        </p:txBody>
+      </p:sp>
+      <p:sp>
+        <p:nvSpPr>
+          <p:cNvPr id="4" name="Slide Number Placeholder 3"/>
+          <p:cNvSpPr>
+            <a:spLocks noGrp="1"/>
+          </p:cNvSpPr>
+          <p:nvPr>
+            <p:ph type="sldNum" sz="quarter" idx="10"/>
+          </p:nvPr>
+        </p:nvSpPr>
+        <p:spPr/>
+        <p:txBody>
+          <a:bodyPr/>
+          <a:lstStyle/>
+          <a:p>
+            <a:fld id="{5257B995-136A-4A15-87A5-26420C3C1021}" type="slidenum">
+              <a:rPr lang="en-US" smtClean="0"/>
+              <a:pPr/>
+              <a:t>13</a:t>
+            </a:fld>
+            <a:endParaRPr lang="en-US"/>
+          </a:p>
+        </p:txBody>
+      </p:sp>
+    </p:spTree>
+    <p:extLst>
+      <p:ext uri="{BB962C8B-B14F-4D97-AF65-F5344CB8AC3E}">
+        <p14:creationId xmlns:p14="http://schemas.microsoft.com/office/powerpoint/2010/main" val="1596843217"/>
+      </p:ext>
+    </p:extLst>
+  </p:cSld>
+  <p:clrMapOvr>
+    <a:masterClrMapping/>
+  </p:clrMapOvr>
+</p:notes>
+</file>
+
 <file path=ppt/notesSlides/notesSlide2.xml><?xml version="1.0" encoding="utf-8"?>
 <p:notes xmlns:a="http://schemas.openxmlformats.org/drawingml/2006/main" xmlns:r="http://schemas.openxmlformats.org/officeDocument/2006/relationships" xmlns:p="http://schemas.openxmlformats.org/presentationml/2006/main">
   <p:cSld>
@@ -1369,7 +1462,7 @@
     </p:spTree>
     <p:extLst>
       <p:ext uri="{BB962C8B-B14F-4D97-AF65-F5344CB8AC3E}">
-        <p14:creationId xmlns:p14="http://schemas.microsoft.com/office/powerpoint/2010/main" val="2589352353"/>
+        <p14:creationId xmlns:p14="http://schemas.microsoft.com/office/powerpoint/2010/main" val="3981386523"/>
       </p:ext>
     </p:extLst>
   </p:cSld>
@@ -1461,7 +1554,7 @@
     </p:spTree>
     <p:extLst>
       <p:ext uri="{BB962C8B-B14F-4D97-AF65-F5344CB8AC3E}">
-        <p14:creationId xmlns:p14="http://schemas.microsoft.com/office/powerpoint/2010/main" val="1596843217"/>
+        <p14:creationId xmlns:p14="http://schemas.microsoft.com/office/powerpoint/2010/main" val="2589352353"/>
       </p:ext>
     </p:extLst>
   </p:cSld>
@@ -5467,6 +5560,123 @@
       </p:grpSpPr>
       <p:sp>
         <p:nvSpPr>
+          <p:cNvPr id="2" name="Title 1"/>
+          <p:cNvSpPr>
+            <a:spLocks noGrp="1"/>
+          </p:cNvSpPr>
+          <p:nvPr>
+            <p:ph type="title"/>
+          </p:nvPr>
+        </p:nvSpPr>
+        <p:spPr/>
+        <p:txBody>
+          <a:bodyPr>
+            <a:normAutofit/>
+          </a:bodyPr>
+          <a:lstStyle/>
+          <a:p>
+            <a:r>
+              <a:rPr lang="en-US" dirty="0"/>
+              <a:t>Application</a:t>
+            </a:r>
+          </a:p>
+        </p:txBody>
+      </p:sp>
+      <p:sp>
+        <p:nvSpPr>
+          <p:cNvPr id="6" name="Content Placeholder 5"/>
+          <p:cNvSpPr>
+            <a:spLocks noGrp="1"/>
+          </p:cNvSpPr>
+          <p:nvPr>
+            <p:ph idx="1"/>
+          </p:nvPr>
+        </p:nvSpPr>
+        <p:spPr/>
+        <p:txBody>
+          <a:bodyPr anchor="ctr"/>
+          <a:lstStyle/>
+          <a:p>
+            <a:pPr marL="266700" indent="-165497">
+              <a:buFont typeface="Arial" panose="020B0604020202020204" pitchFamily="34" charset="0"/>
+              <a:buChar char="•"/>
+            </a:pPr>
+            <a:r>
+              <a:rPr lang="en-US" sz="2100" dirty="0"/>
+              <a:t>Made initial data editable by expert</a:t>
+            </a:r>
+          </a:p>
+          <a:p>
+            <a:pPr marL="266700" indent="-165497">
+              <a:buFont typeface="Arial" panose="020B0604020202020204" pitchFamily="34" charset="0"/>
+              <a:buChar char="•"/>
+            </a:pPr>
+            <a:r>
+              <a:rPr lang="en-US" sz="2100" dirty="0"/>
+              <a:t>Used lots of design patterns</a:t>
+            </a:r>
+          </a:p>
+          <a:p>
+            <a:pPr marL="266700" indent="-165497">
+              <a:buFont typeface="Arial" panose="020B0604020202020204" pitchFamily="34" charset="0"/>
+              <a:buChar char="•"/>
+            </a:pPr>
+            <a:r>
+              <a:rPr lang="en-US" sz="2100" dirty="0"/>
+              <a:t>Made code as scalable as possible</a:t>
+            </a:r>
+          </a:p>
+          <a:p>
+            <a:pPr marL="266700" indent="-165497">
+              <a:buFont typeface="Arial" panose="020B0604020202020204" pitchFamily="34" charset="0"/>
+              <a:buChar char="•"/>
+            </a:pPr>
+            <a:r>
+              <a:rPr lang="en-US" sz="2100" dirty="0"/>
+              <a:t>Code is, to this point, very structured</a:t>
+            </a:r>
+          </a:p>
+          <a:p>
+            <a:pPr marL="266700" indent="-165497">
+              <a:buFont typeface="Arial" panose="020B0604020202020204" pitchFamily="34" charset="0"/>
+              <a:buChar char="•"/>
+            </a:pPr>
+            <a:endParaRPr lang="en-US" sz="2100" dirty="0"/>
+          </a:p>
+        </p:txBody>
+      </p:sp>
+    </p:spTree>
+    <p:extLst>
+      <p:ext uri="{BB962C8B-B14F-4D97-AF65-F5344CB8AC3E}">
+        <p14:creationId xmlns:p14="http://schemas.microsoft.com/office/powerpoint/2010/main" val="1475295642"/>
+      </p:ext>
+    </p:extLst>
+  </p:cSld>
+  <p:clrMapOvr>
+    <a:masterClrMapping/>
+  </p:clrMapOvr>
+</p:sld>
+</file>
+
+<file path=ppt/slides/slide12.xml><?xml version="1.0" encoding="utf-8"?>
+<p:sld xmlns:a="http://schemas.openxmlformats.org/drawingml/2006/main" xmlns:r="http://schemas.openxmlformats.org/officeDocument/2006/relationships" xmlns:p="http://schemas.openxmlformats.org/presentationml/2006/main">
+  <p:cSld>
+    <p:spTree>
+      <p:nvGrpSpPr>
+        <p:cNvPr id="1" name=""/>
+        <p:cNvGrpSpPr/>
+        <p:nvPr/>
+      </p:nvGrpSpPr>
+      <p:grpSpPr>
+        <a:xfrm>
+          <a:off x="0" y="0"/>
+          <a:ext cx="0" cy="0"/>
+          <a:chOff x="0" y="0"/>
+          <a:chExt cx="0" cy="0"/>
+        </a:xfrm>
+      </p:grpSpPr>
+      <p:sp>
+        <p:nvSpPr>
           <p:cNvPr id="5" name="Rectangle 4">
             <a:extLst>
               <a:ext uri="{FF2B5EF4-FFF2-40B4-BE49-F238E27FC236}">
@@ -5595,7 +5805,7 @@
 </p:sld>
 </file>
 
-<file path=ppt/slides/slide12.xml><?xml version="1.0" encoding="utf-8"?>
+<file path=ppt/slides/slide13.xml><?xml version="1.0" encoding="utf-8"?>
 <p:sld xmlns:a="http://schemas.openxmlformats.org/drawingml/2006/main" xmlns:r="http://schemas.openxmlformats.org/officeDocument/2006/relationships" xmlns:p="http://schemas.openxmlformats.org/presentationml/2006/main">
   <p:cSld>
     <p:spTree>
@@ -6204,38 +6414,6 @@
           <a:chExt cx="0" cy="0"/>
         </a:xfrm>
       </p:grpSpPr>
-      <p:sp>
-        <p:nvSpPr>
-          <p:cNvPr id="2" name="Title 1">
-            <a:extLst>
-              <a:ext uri="{FF2B5EF4-FFF2-40B4-BE49-F238E27FC236}">
-                <a16:creationId xmlns:a16="http://schemas.microsoft.com/office/drawing/2014/main" id="{E9DCA133-9214-4080-B7B5-1CE2BE6239C3}"/>
-              </a:ext>
-            </a:extLst>
-          </p:cNvPr>
-          <p:cNvSpPr>
-            <a:spLocks noGrp="1"/>
-          </p:cNvSpPr>
-          <p:nvPr>
-            <p:ph type="title"/>
-          </p:nvPr>
-        </p:nvSpPr>
-        <p:spPr>
-          <a:xfrm flipV="1">
-            <a:off x="884539" y="214314"/>
-            <a:ext cx="8108276" cy="72292"/>
-          </a:xfrm>
-        </p:spPr>
-        <p:txBody>
-          <a:bodyPr>
-            <a:normAutofit fontScale="90000"/>
-          </a:bodyPr>
-          <a:lstStyle/>
-          <a:p>
-            <a:endParaRPr lang="en-US" b="1" i="1" dirty="0"/>
-          </a:p>
-        </p:txBody>
-      </p:sp>
       <p:pic>
         <p:nvPicPr>
           <p:cNvPr id="5" name="Content Placeholder 4" descr="A close up of a newspaper&#10;&#10;Description automatically generated">
@@ -6260,7 +6438,7 @@
         </p:blipFill>
         <p:spPr>
           <a:xfrm>
-            <a:off x="536118" y="286606"/>
+            <a:off x="536118" y="961300"/>
             <a:ext cx="8755976" cy="4312768"/>
           </a:xfrm>
         </p:spPr>
@@ -6279,7 +6457,7 @@
         </p:nvSpPr>
         <p:spPr>
           <a:xfrm rot="10800000" flipV="1">
-            <a:off x="6229350" y="4491653"/>
+            <a:off x="6310032" y="5311924"/>
             <a:ext cx="3079606" cy="584775"/>
           </a:xfrm>
           <a:prstGeom prst="rect">

</xml_diff>